<commit_message>
Update Zorow deck and add Zowe
Signed-off-by: John Mertic <jmertic@linuxfoundation.org>
</commit_message>
<xml_diff>
--- a/overview_deck/zorow_overview_deck.pptx
+++ b/overview_deck/zorow_overview_deck.pptx
@@ -9790,8 +9790,8 @@
         </p:nvSpPr>
         <p:spPr>
           <a:xfrm>
-            <a:off x="1375315" y="0"/>
-            <a:ext cx="4349209" cy="2638424"/>
+            <a:off x="1290025" y="0"/>
+            <a:ext cx="4434600" cy="2638500"/>
           </a:xfrm>
           <a:prstGeom prst="rect">
             <a:avLst/>
@@ -9937,44 +9937,25 @@
           </a:bodyPr>
           <a:lstStyle/>
           <a:p>
-            <a:pPr indent="-231775" lvl="0" marL="231775" marR="0" rtl="0" algn="l">
-              <a:lnSpc>
-                <a:spcPct val="100000"/>
-              </a:lnSpc>
-              <a:spcBef>
-                <a:spcPts val="0"/>
-              </a:spcBef>
-              <a:spcAft>
-                <a:spcPts val="0"/>
-              </a:spcAft>
-              <a:buClr>
-                <a:schemeClr val="dk1"/>
-              </a:buClr>
+            <a:pPr indent="-203200" lvl="0" marL="342900" rtl="0" algn="l">
+              <a:spcBef>
+                <a:spcPts val="0"/>
+              </a:spcBef>
+              <a:spcAft>
+                <a:spcPts val="0"/>
+              </a:spcAft>
               <a:buSzPts val="1800"/>
-              <a:buFont typeface="Arial"/>
               <a:buChar char="•"/>
             </a:pPr>
             <a:r>
-              <a:rPr b="0" i="0" lang="en-US" sz="1800" u="none" cap="none" strike="noStrike">
-                <a:solidFill>
-                  <a:schemeClr val="dk1"/>
-                </a:solidFill>
-                <a:latin typeface="Gill Sans"/>
-                <a:ea typeface="Gill Sans"/>
-                <a:cs typeface="Gill Sans"/>
-                <a:sym typeface="Gill Sans"/>
-              </a:rPr>
+              <a:rPr lang="en-US" sz="1800"/>
               <a:t>Find out more and subscribe to our newsletter at </a:t>
             </a:r>
             <a:r>
-              <a:rPr b="0" i="0" lang="en-US" sz="1800" u="sng" cap="none" strike="noStrike">
+              <a:rPr lang="en-US" sz="1800" u="sng">
                 <a:solidFill>
                   <a:schemeClr val="hlink"/>
                 </a:solidFill>
-                <a:latin typeface="Gill Sans"/>
-                <a:ea typeface="Gill Sans"/>
-                <a:cs typeface="Gill Sans"/>
-                <a:sym typeface="Gill Sans"/>
                 <a:hlinkClick r:id="rId4"/>
               </a:rPr>
               <a:t>www.openmainframeproject.org</a:t>
@@ -9982,91 +9963,103 @@
             <a:endParaRPr/>
           </a:p>
           <a:p>
-            <a:pPr indent="-231775" lvl="0" marL="231775" marR="0" rtl="0" algn="l">
-              <a:lnSpc>
-                <a:spcPct val="100000"/>
-              </a:lnSpc>
+            <a:pPr indent="-203200" lvl="0" marL="342900" rtl="0" algn="l">
               <a:spcBef>
                 <a:spcPts val="720"/>
               </a:spcBef>
               <a:spcAft>
                 <a:spcPts val="0"/>
               </a:spcAft>
-              <a:buClr>
-                <a:schemeClr val="dk1"/>
-              </a:buClr>
               <a:buSzPts val="1800"/>
-              <a:buFont typeface="Arial"/>
               <a:buChar char="•"/>
             </a:pPr>
             <a:r>
               <a:rPr lang="en-US" sz="1800"/>
-              <a:t>O</a:t>
-            </a:r>
-            <a:r>
-              <a:rPr b="0" i="0" lang="en-US" sz="1800" u="none" cap="none" strike="noStrike">
-                <a:solidFill>
-                  <a:schemeClr val="dk1"/>
-                </a:solidFill>
-                <a:latin typeface="Gill Sans"/>
-                <a:ea typeface="Gill Sans"/>
-                <a:cs typeface="Gill Sans"/>
-                <a:sym typeface="Gill Sans"/>
-              </a:rPr>
-              <a:t>rganizational membership opportunities at </a:t>
-            </a:r>
-            <a:r>
-              <a:rPr b="0" i="0" lang="en-US" sz="1800" u="sng" cap="none" strike="noStrike">
-                <a:solidFill>
-                  <a:schemeClr val="hlink"/>
-                </a:solidFill>
-                <a:latin typeface="Gill Sans"/>
-                <a:ea typeface="Gill Sans"/>
-                <a:cs typeface="Gill Sans"/>
-                <a:sym typeface="Gill Sans"/>
-                <a:hlinkClick r:id="rId5"/>
-              </a:rPr>
-              <a:t>https://www.openmainframeproject.org/about/join</a:t>
-            </a:r>
-            <a:r>
-              <a:rPr b="0" i="0" lang="en-US" sz="1800" u="none" cap="none" strike="noStrike">
-                <a:solidFill>
-                  <a:schemeClr val="dk1"/>
-                </a:solidFill>
-                <a:latin typeface="Gill Sans"/>
-                <a:ea typeface="Gill Sans"/>
-                <a:cs typeface="Gill Sans"/>
-                <a:sym typeface="Gill Sans"/>
-              </a:rPr>
-              <a:t> or email at </a:t>
-            </a:r>
-            <a:r>
-              <a:rPr b="0" i="0" lang="en-US" sz="1800" u="sng" cap="none" strike="noStrike">
-                <a:solidFill>
-                  <a:schemeClr val="hlink"/>
-                </a:solidFill>
-                <a:latin typeface="Gill Sans"/>
-                <a:ea typeface="Gill Sans"/>
-                <a:cs typeface="Gill Sans"/>
-                <a:sym typeface="Gill Sans"/>
-                <a:hlinkClick r:id="rId6"/>
-              </a:rPr>
-              <a:t>membership@openmainframe</a:t>
+              <a:t>Check out our projects at </a:t>
             </a:r>
             <a:r>
               <a:rPr lang="en-US" sz="1800" u="sng">
                 <a:solidFill>
                   <a:schemeClr val="hlink"/>
                 </a:solidFill>
-                <a:hlinkClick r:id="rId7"/>
+                <a:hlinkClick r:id="rId5"/>
               </a:rPr>
-              <a:t>project.com</a:t>
+              <a:t>https://www.openmainframeproject.org/projects</a:t>
             </a:r>
             <a:r>
               <a:rPr lang="en-US" sz="1800"/>
               <a:t> </a:t>
             </a:r>
-            <a:endParaRPr/>
+            <a:endParaRPr sz="1800"/>
+          </a:p>
+          <a:p>
+            <a:pPr indent="-203200" lvl="0" marL="342900" rtl="0" algn="l">
+              <a:spcBef>
+                <a:spcPts val="720"/>
+              </a:spcBef>
+              <a:spcAft>
+                <a:spcPts val="0"/>
+              </a:spcAft>
+              <a:buSzPts val="1800"/>
+              <a:buChar char="•"/>
+            </a:pPr>
+            <a:r>
+              <a:rPr lang="en-US" sz="1800"/>
+              <a:t>See the full landscape of open source on the mainframe at </a:t>
+            </a:r>
+            <a:r>
+              <a:rPr lang="en-US" sz="1800" u="sng">
+                <a:solidFill>
+                  <a:schemeClr val="hlink"/>
+                </a:solidFill>
+                <a:hlinkClick r:id="rId6"/>
+              </a:rPr>
+              <a:t>https://l.openmainframeproject.org</a:t>
+            </a:r>
+            <a:r>
+              <a:rPr lang="en-US" sz="1800"/>
+              <a:t> </a:t>
+            </a:r>
+            <a:endParaRPr sz="1800"/>
+          </a:p>
+          <a:p>
+            <a:pPr indent="-203200" lvl="0" marL="342900" rtl="0" algn="l">
+              <a:spcBef>
+                <a:spcPts val="720"/>
+              </a:spcBef>
+              <a:spcAft>
+                <a:spcPts val="0"/>
+              </a:spcAft>
+              <a:buSzPts val="1800"/>
+              <a:buChar char="•"/>
+            </a:pPr>
+            <a:r>
+              <a:rPr lang="en-US" sz="1800"/>
+              <a:t>Organizational membership opportunities at </a:t>
+            </a:r>
+            <a:r>
+              <a:rPr lang="en-US" sz="1800" u="sng">
+                <a:solidFill>
+                  <a:schemeClr val="hlink"/>
+                </a:solidFill>
+                <a:hlinkClick r:id="rId7"/>
+              </a:rPr>
+              <a:t>https://www.openmainframeproject.org/about/join</a:t>
+            </a:r>
+            <a:r>
+              <a:rPr lang="en-US" sz="1800"/>
+              <a:t> or email at </a:t>
+            </a:r>
+            <a:r>
+              <a:rPr lang="en-US" sz="1800" u="sng">
+                <a:solidFill>
+                  <a:schemeClr val="hlink"/>
+                </a:solidFill>
+                <a:hlinkClick r:id="rId8"/>
+              </a:rPr>
+              <a:t>membership@openmainframeproject.com</a:t>
+            </a:r>
+            <a:endParaRPr sz="1800"/>
           </a:p>
         </p:txBody>
       </p:sp>
@@ -10077,7 +10070,7 @@
           <p:nvPr/>
         </p:nvPicPr>
         <p:blipFill rotWithShape="1">
-          <a:blip r:embed="rId8">
+          <a:blip r:embed="rId9">
             <a:alphaModFix/>
           </a:blip>
           <a:srcRect b="0" l="0" r="0" t="0"/>
@@ -10232,6 +10225,285 @@
 </file>
 
 <file path=ppt/theme/theme1.xml><?xml version="1.0" encoding="utf-8"?>
+<a:theme xmlns:a="http://schemas.openxmlformats.org/drawingml/2006/main" xmlns:r="http://schemas.openxmlformats.org/officeDocument/2006/relationships" name="Office Theme">
+  <a:themeElements>
+    <a:clrScheme name="Office">
+      <a:dk1>
+        <a:srgbClr val="000000"/>
+      </a:dk1>
+      <a:lt1>
+        <a:srgbClr val="FFFFFF"/>
+      </a:lt1>
+      <a:dk2>
+        <a:srgbClr val="1F497D"/>
+      </a:dk2>
+      <a:lt2>
+        <a:srgbClr val="EEECE1"/>
+      </a:lt2>
+      <a:accent1>
+        <a:srgbClr val="4F81BD"/>
+      </a:accent1>
+      <a:accent2>
+        <a:srgbClr val="C0504D"/>
+      </a:accent2>
+      <a:accent3>
+        <a:srgbClr val="9BBB59"/>
+      </a:accent3>
+      <a:accent4>
+        <a:srgbClr val="8064A2"/>
+      </a:accent4>
+      <a:accent5>
+        <a:srgbClr val="4BACC6"/>
+      </a:accent5>
+      <a:accent6>
+        <a:srgbClr val="F79646"/>
+      </a:accent6>
+      <a:hlink>
+        <a:srgbClr val="0000FF"/>
+      </a:hlink>
+      <a:folHlink>
+        <a:srgbClr val="800080"/>
+      </a:folHlink>
+    </a:clrScheme>
+    <a:fontScheme name="Office">
+      <a:majorFont>
+        <a:latin typeface="Arial"/>
+        <a:ea typeface=""/>
+        <a:cs typeface=""/>
+        <a:font script="Jpan" typeface="ＭＳ Ｐゴシック"/>
+        <a:font script="Hang" typeface="맑은 고딕"/>
+        <a:font script="Hans" typeface="宋体"/>
+        <a:font script="Hant" typeface="新細明體"/>
+        <a:font script="Arab" typeface="Times New Roman"/>
+        <a:font script="Hebr" typeface="Times New Roman"/>
+        <a:font script="Thai" typeface="Angsana New"/>
+        <a:font script="Ethi" typeface="Nyala"/>
+        <a:font script="Beng" typeface="Vrinda"/>
+        <a:font script="Gujr" typeface="Shruti"/>
+        <a:font script="Khmr" typeface="MoolBoran"/>
+        <a:font script="Knda" typeface="Tunga"/>
+        <a:font script="Guru" typeface="Raavi"/>
+        <a:font script="Cans" typeface="Euphemia"/>
+        <a:font script="Cher" typeface="Plantagenet Cherokee"/>
+        <a:font script="Yiii" typeface="Microsoft Yi Baiti"/>
+        <a:font script="Tibt" typeface="Microsoft Himalaya"/>
+        <a:font script="Thaa" typeface="MV Boli"/>
+        <a:font script="Deva" typeface="Mangal"/>
+        <a:font script="Telu" typeface="Gautami"/>
+        <a:font script="Taml" typeface="Latha"/>
+        <a:font script="Syrc" typeface="Estrangelo Edessa"/>
+        <a:font script="Orya" typeface="Kalinga"/>
+        <a:font script="Mlym" typeface="Kartika"/>
+        <a:font script="Laoo" typeface="DokChampa"/>
+        <a:font script="Sinh" typeface="Iskoola Pota"/>
+        <a:font script="Mong" typeface="Mongolian Baiti"/>
+        <a:font script="Viet" typeface="Times New Roman"/>
+        <a:font script="Uigh" typeface="Microsoft Uighur"/>
+        <a:font script="Geor" typeface="Sylfaen"/>
+      </a:majorFont>
+      <a:minorFont>
+        <a:latin typeface="Arial"/>
+        <a:ea typeface=""/>
+        <a:cs typeface=""/>
+        <a:font script="Jpan" typeface="ＭＳ Ｐゴシック"/>
+        <a:font script="Hang" typeface="맑은 고딕"/>
+        <a:font script="Hans" typeface="宋体"/>
+        <a:font script="Hant" typeface="新細明體"/>
+        <a:font script="Arab" typeface="Arial"/>
+        <a:font script="Hebr" typeface="Arial"/>
+        <a:font script="Thai" typeface="Cordia New"/>
+        <a:font script="Ethi" typeface="Nyala"/>
+        <a:font script="Beng" typeface="Vrinda"/>
+        <a:font script="Gujr" typeface="Shruti"/>
+        <a:font script="Khmr" typeface="DaunPenh"/>
+        <a:font script="Knda" typeface="Tunga"/>
+        <a:font script="Guru" typeface="Raavi"/>
+        <a:font script="Cans" typeface="Euphemia"/>
+        <a:font script="Cher" typeface="Plantagenet Cherokee"/>
+        <a:font script="Yiii" typeface="Microsoft Yi Baiti"/>
+        <a:font script="Tibt" typeface="Microsoft Himalaya"/>
+        <a:font script="Thaa" typeface="MV Boli"/>
+        <a:font script="Deva" typeface="Mangal"/>
+        <a:font script="Telu" typeface="Gautami"/>
+        <a:font script="Taml" typeface="Latha"/>
+        <a:font script="Syrc" typeface="Estrangelo Edessa"/>
+        <a:font script="Orya" typeface="Kalinga"/>
+        <a:font script="Mlym" typeface="Kartika"/>
+        <a:font script="Laoo" typeface="DokChampa"/>
+        <a:font script="Sinh" typeface="Iskoola Pota"/>
+        <a:font script="Mong" typeface="Mongolian Baiti"/>
+        <a:font script="Viet" typeface="Arial"/>
+        <a:font script="Uigh" typeface="Microsoft Uighur"/>
+        <a:font script="Geor" typeface="Sylfaen"/>
+      </a:minorFont>
+    </a:fontScheme>
+    <a:fmtScheme name="Office">
+      <a:fillStyleLst>
+        <a:solidFill>
+          <a:schemeClr val="phClr"/>
+        </a:solidFill>
+        <a:gradFill rotWithShape="1">
+          <a:gsLst>
+            <a:gs pos="0">
+              <a:schemeClr val="phClr">
+                <a:tint val="50000"/>
+                <a:satMod val="300000"/>
+              </a:schemeClr>
+            </a:gs>
+            <a:gs pos="35000">
+              <a:schemeClr val="phClr">
+                <a:tint val="37000"/>
+                <a:satMod val="300000"/>
+              </a:schemeClr>
+            </a:gs>
+            <a:gs pos="100000">
+              <a:schemeClr val="phClr">
+                <a:tint val="15000"/>
+                <a:satMod val="350000"/>
+              </a:schemeClr>
+            </a:gs>
+          </a:gsLst>
+          <a:lin ang="16200000" scaled="1"/>
+        </a:gradFill>
+        <a:gradFill rotWithShape="1">
+          <a:gsLst>
+            <a:gs pos="0">
+              <a:schemeClr val="phClr">
+                <a:tint val="100000"/>
+                <a:shade val="100000"/>
+                <a:satMod val="130000"/>
+              </a:schemeClr>
+            </a:gs>
+            <a:gs pos="100000">
+              <a:schemeClr val="phClr">
+                <a:tint val="50000"/>
+                <a:shade val="100000"/>
+                <a:satMod val="350000"/>
+              </a:schemeClr>
+            </a:gs>
+          </a:gsLst>
+          <a:lin ang="16200000" scaled="0"/>
+        </a:gradFill>
+      </a:fillStyleLst>
+      <a:lnStyleLst>
+        <a:ln w="9525" cap="flat" cmpd="sng" algn="ctr">
+          <a:solidFill>
+            <a:schemeClr val="phClr">
+              <a:shade val="95000"/>
+              <a:satMod val="105000"/>
+            </a:schemeClr>
+          </a:solidFill>
+          <a:prstDash val="solid"/>
+        </a:ln>
+        <a:ln w="25400" cap="flat" cmpd="sng" algn="ctr">
+          <a:solidFill>
+            <a:schemeClr val="phClr"/>
+          </a:solidFill>
+          <a:prstDash val="solid"/>
+        </a:ln>
+        <a:ln w="38100" cap="flat" cmpd="sng" algn="ctr">
+          <a:solidFill>
+            <a:schemeClr val="phClr"/>
+          </a:solidFill>
+          <a:prstDash val="solid"/>
+        </a:ln>
+      </a:lnStyleLst>
+      <a:effectStyleLst>
+        <a:effectStyle>
+          <a:effectLst>
+            <a:outerShdw blurRad="40000" dist="20000" dir="5400000" rotWithShape="0">
+              <a:srgbClr val="000000">
+                <a:alpha val="38000"/>
+              </a:srgbClr>
+            </a:outerShdw>
+          </a:effectLst>
+        </a:effectStyle>
+        <a:effectStyle>
+          <a:effectLst>
+            <a:outerShdw blurRad="40000" dist="23000" dir="5400000" rotWithShape="0">
+              <a:srgbClr val="000000">
+                <a:alpha val="35000"/>
+              </a:srgbClr>
+            </a:outerShdw>
+          </a:effectLst>
+        </a:effectStyle>
+        <a:effectStyle>
+          <a:effectLst>
+            <a:outerShdw blurRad="40000" dist="23000" dir="5400000" rotWithShape="0">
+              <a:srgbClr val="000000">
+                <a:alpha val="35000"/>
+              </a:srgbClr>
+            </a:outerShdw>
+          </a:effectLst>
+          <a:scene3d>
+            <a:camera prst="orthographicFront">
+              <a:rot lat="0" lon="0" rev="0"/>
+            </a:camera>
+            <a:lightRig rig="threePt" dir="t">
+              <a:rot lat="0" lon="0" rev="1200000"/>
+            </a:lightRig>
+          </a:scene3d>
+          <a:sp3d>
+            <a:bevelT w="63500" h="25400"/>
+          </a:sp3d>
+        </a:effectStyle>
+      </a:effectStyleLst>
+      <a:bgFillStyleLst>
+        <a:solidFill>
+          <a:schemeClr val="phClr"/>
+        </a:solidFill>
+        <a:gradFill rotWithShape="1">
+          <a:gsLst>
+            <a:gs pos="0">
+              <a:schemeClr val="phClr">
+                <a:tint val="40000"/>
+                <a:satMod val="350000"/>
+              </a:schemeClr>
+            </a:gs>
+            <a:gs pos="40000">
+              <a:schemeClr val="phClr">
+                <a:tint val="45000"/>
+                <a:shade val="99000"/>
+                <a:satMod val="350000"/>
+              </a:schemeClr>
+            </a:gs>
+            <a:gs pos="100000">
+              <a:schemeClr val="phClr">
+                <a:shade val="20000"/>
+                <a:satMod val="255000"/>
+              </a:schemeClr>
+            </a:gs>
+          </a:gsLst>
+          <a:path path="circle">
+            <a:fillToRect l="50000" t="-80000" r="50000" b="180000"/>
+          </a:path>
+        </a:gradFill>
+        <a:gradFill rotWithShape="1">
+          <a:gsLst>
+            <a:gs pos="0">
+              <a:schemeClr val="phClr">
+                <a:tint val="80000"/>
+                <a:satMod val="300000"/>
+              </a:schemeClr>
+            </a:gs>
+            <a:gs pos="100000">
+              <a:schemeClr val="phClr">
+                <a:shade val="30000"/>
+                <a:satMod val="200000"/>
+              </a:schemeClr>
+            </a:gs>
+          </a:gsLst>
+          <a:path path="circle">
+            <a:fillToRect l="50000" t="50000" r="50000" b="50000"/>
+          </a:path>
+        </a:gradFill>
+      </a:bgFillStyleLst>
+    </a:fmtScheme>
+  </a:themeElements>
+</a:theme>
+</file>
+
+<file path=ppt/theme/theme2.xml><?xml version="1.0" encoding="utf-8"?>
 <a:theme xmlns:a="http://schemas.openxmlformats.org/drawingml/2006/main" xmlns:r="http://schemas.openxmlformats.org/officeDocument/2006/relationships" name="Office Theme">
   <a:themeElements>
     <a:clrScheme name="Office">
@@ -10508,283 +10780,4 @@
     </a:fmtScheme>
   </a:themeElements>
 </a:theme>
-</file>
-
-<file path=ppt/theme/theme2.xml><?xml version="1.0" encoding="utf-8"?>
-<a:theme xmlns:a="http://schemas.openxmlformats.org/drawingml/2006/main" xmlns:r="http://schemas.openxmlformats.org/officeDocument/2006/relationships" name="Office Theme">
-  <a:themeElements>
-    <a:clrScheme name="Office">
-      <a:dk1>
-        <a:srgbClr val="000000"/>
-      </a:dk1>
-      <a:lt1>
-        <a:srgbClr val="FFFFFF"/>
-      </a:lt1>
-      <a:dk2>
-        <a:srgbClr val="1F497D"/>
-      </a:dk2>
-      <a:lt2>
-        <a:srgbClr val="EEECE1"/>
-      </a:lt2>
-      <a:accent1>
-        <a:srgbClr val="4F81BD"/>
-      </a:accent1>
-      <a:accent2>
-        <a:srgbClr val="C0504D"/>
-      </a:accent2>
-      <a:accent3>
-        <a:srgbClr val="9BBB59"/>
-      </a:accent3>
-      <a:accent4>
-        <a:srgbClr val="8064A2"/>
-      </a:accent4>
-      <a:accent5>
-        <a:srgbClr val="4BACC6"/>
-      </a:accent5>
-      <a:accent6>
-        <a:srgbClr val="F79646"/>
-      </a:accent6>
-      <a:hlink>
-        <a:srgbClr val="0000FF"/>
-      </a:hlink>
-      <a:folHlink>
-        <a:srgbClr val="800080"/>
-      </a:folHlink>
-    </a:clrScheme>
-    <a:fontScheme name="Office">
-      <a:majorFont>
-        <a:latin typeface="Arial"/>
-        <a:ea typeface=""/>
-        <a:cs typeface=""/>
-        <a:font script="Jpan" typeface="ＭＳ Ｐゴシック"/>
-        <a:font script="Hang" typeface="맑은 고딕"/>
-        <a:font script="Hans" typeface="宋体"/>
-        <a:font script="Hant" typeface="新細明體"/>
-        <a:font script="Arab" typeface="Times New Roman"/>
-        <a:font script="Hebr" typeface="Times New Roman"/>
-        <a:font script="Thai" typeface="Angsana New"/>
-        <a:font script="Ethi" typeface="Nyala"/>
-        <a:font script="Beng" typeface="Vrinda"/>
-        <a:font script="Gujr" typeface="Shruti"/>
-        <a:font script="Khmr" typeface="MoolBoran"/>
-        <a:font script="Knda" typeface="Tunga"/>
-        <a:font script="Guru" typeface="Raavi"/>
-        <a:font script="Cans" typeface="Euphemia"/>
-        <a:font script="Cher" typeface="Plantagenet Cherokee"/>
-        <a:font script="Yiii" typeface="Microsoft Yi Baiti"/>
-        <a:font script="Tibt" typeface="Microsoft Himalaya"/>
-        <a:font script="Thaa" typeface="MV Boli"/>
-        <a:font script="Deva" typeface="Mangal"/>
-        <a:font script="Telu" typeface="Gautami"/>
-        <a:font script="Taml" typeface="Latha"/>
-        <a:font script="Syrc" typeface="Estrangelo Edessa"/>
-        <a:font script="Orya" typeface="Kalinga"/>
-        <a:font script="Mlym" typeface="Kartika"/>
-        <a:font script="Laoo" typeface="DokChampa"/>
-        <a:font script="Sinh" typeface="Iskoola Pota"/>
-        <a:font script="Mong" typeface="Mongolian Baiti"/>
-        <a:font script="Viet" typeface="Times New Roman"/>
-        <a:font script="Uigh" typeface="Microsoft Uighur"/>
-        <a:font script="Geor" typeface="Sylfaen"/>
-      </a:majorFont>
-      <a:minorFont>
-        <a:latin typeface="Arial"/>
-        <a:ea typeface=""/>
-        <a:cs typeface=""/>
-        <a:font script="Jpan" typeface="ＭＳ Ｐゴシック"/>
-        <a:font script="Hang" typeface="맑은 고딕"/>
-        <a:font script="Hans" typeface="宋体"/>
-        <a:font script="Hant" typeface="新細明體"/>
-        <a:font script="Arab" typeface="Arial"/>
-        <a:font script="Hebr" typeface="Arial"/>
-        <a:font script="Thai" typeface="Cordia New"/>
-        <a:font script="Ethi" typeface="Nyala"/>
-        <a:font script="Beng" typeface="Vrinda"/>
-        <a:font script="Gujr" typeface="Shruti"/>
-        <a:font script="Khmr" typeface="DaunPenh"/>
-        <a:font script="Knda" typeface="Tunga"/>
-        <a:font script="Guru" typeface="Raavi"/>
-        <a:font script="Cans" typeface="Euphemia"/>
-        <a:font script="Cher" typeface="Plantagenet Cherokee"/>
-        <a:font script="Yiii" typeface="Microsoft Yi Baiti"/>
-        <a:font script="Tibt" typeface="Microsoft Himalaya"/>
-        <a:font script="Thaa" typeface="MV Boli"/>
-        <a:font script="Deva" typeface="Mangal"/>
-        <a:font script="Telu" typeface="Gautami"/>
-        <a:font script="Taml" typeface="Latha"/>
-        <a:font script="Syrc" typeface="Estrangelo Edessa"/>
-        <a:font script="Orya" typeface="Kalinga"/>
-        <a:font script="Mlym" typeface="Kartika"/>
-        <a:font script="Laoo" typeface="DokChampa"/>
-        <a:font script="Sinh" typeface="Iskoola Pota"/>
-        <a:font script="Mong" typeface="Mongolian Baiti"/>
-        <a:font script="Viet" typeface="Arial"/>
-        <a:font script="Uigh" typeface="Microsoft Uighur"/>
-        <a:font script="Geor" typeface="Sylfaen"/>
-      </a:minorFont>
-    </a:fontScheme>
-    <a:fmtScheme name="Office">
-      <a:fillStyleLst>
-        <a:solidFill>
-          <a:schemeClr val="phClr"/>
-        </a:solidFill>
-        <a:gradFill rotWithShape="1">
-          <a:gsLst>
-            <a:gs pos="0">
-              <a:schemeClr val="phClr">
-                <a:tint val="50000"/>
-                <a:satMod val="300000"/>
-              </a:schemeClr>
-            </a:gs>
-            <a:gs pos="35000">
-              <a:schemeClr val="phClr">
-                <a:tint val="37000"/>
-                <a:satMod val="300000"/>
-              </a:schemeClr>
-            </a:gs>
-            <a:gs pos="100000">
-              <a:schemeClr val="phClr">
-                <a:tint val="15000"/>
-                <a:satMod val="350000"/>
-              </a:schemeClr>
-            </a:gs>
-          </a:gsLst>
-          <a:lin ang="16200000" scaled="1"/>
-        </a:gradFill>
-        <a:gradFill rotWithShape="1">
-          <a:gsLst>
-            <a:gs pos="0">
-              <a:schemeClr val="phClr">
-                <a:tint val="100000"/>
-                <a:shade val="100000"/>
-                <a:satMod val="130000"/>
-              </a:schemeClr>
-            </a:gs>
-            <a:gs pos="100000">
-              <a:schemeClr val="phClr">
-                <a:tint val="50000"/>
-                <a:shade val="100000"/>
-                <a:satMod val="350000"/>
-              </a:schemeClr>
-            </a:gs>
-          </a:gsLst>
-          <a:lin ang="16200000" scaled="0"/>
-        </a:gradFill>
-      </a:fillStyleLst>
-      <a:lnStyleLst>
-        <a:ln w="9525" cap="flat" cmpd="sng" algn="ctr">
-          <a:solidFill>
-            <a:schemeClr val="phClr">
-              <a:shade val="95000"/>
-              <a:satMod val="105000"/>
-            </a:schemeClr>
-          </a:solidFill>
-          <a:prstDash val="solid"/>
-        </a:ln>
-        <a:ln w="25400" cap="flat" cmpd="sng" algn="ctr">
-          <a:solidFill>
-            <a:schemeClr val="phClr"/>
-          </a:solidFill>
-          <a:prstDash val="solid"/>
-        </a:ln>
-        <a:ln w="38100" cap="flat" cmpd="sng" algn="ctr">
-          <a:solidFill>
-            <a:schemeClr val="phClr"/>
-          </a:solidFill>
-          <a:prstDash val="solid"/>
-        </a:ln>
-      </a:lnStyleLst>
-      <a:effectStyleLst>
-        <a:effectStyle>
-          <a:effectLst>
-            <a:outerShdw blurRad="40000" dist="20000" dir="5400000" rotWithShape="0">
-              <a:srgbClr val="000000">
-                <a:alpha val="38000"/>
-              </a:srgbClr>
-            </a:outerShdw>
-          </a:effectLst>
-        </a:effectStyle>
-        <a:effectStyle>
-          <a:effectLst>
-            <a:outerShdw blurRad="40000" dist="23000" dir="5400000" rotWithShape="0">
-              <a:srgbClr val="000000">
-                <a:alpha val="35000"/>
-              </a:srgbClr>
-            </a:outerShdw>
-          </a:effectLst>
-        </a:effectStyle>
-        <a:effectStyle>
-          <a:effectLst>
-            <a:outerShdw blurRad="40000" dist="23000" dir="5400000" rotWithShape="0">
-              <a:srgbClr val="000000">
-                <a:alpha val="35000"/>
-              </a:srgbClr>
-            </a:outerShdw>
-          </a:effectLst>
-          <a:scene3d>
-            <a:camera prst="orthographicFront">
-              <a:rot lat="0" lon="0" rev="0"/>
-            </a:camera>
-            <a:lightRig rig="threePt" dir="t">
-              <a:rot lat="0" lon="0" rev="1200000"/>
-            </a:lightRig>
-          </a:scene3d>
-          <a:sp3d>
-            <a:bevelT w="63500" h="25400"/>
-          </a:sp3d>
-        </a:effectStyle>
-      </a:effectStyleLst>
-      <a:bgFillStyleLst>
-        <a:solidFill>
-          <a:schemeClr val="phClr"/>
-        </a:solidFill>
-        <a:gradFill rotWithShape="1">
-          <a:gsLst>
-            <a:gs pos="0">
-              <a:schemeClr val="phClr">
-                <a:tint val="40000"/>
-                <a:satMod val="350000"/>
-              </a:schemeClr>
-            </a:gs>
-            <a:gs pos="40000">
-              <a:schemeClr val="phClr">
-                <a:tint val="45000"/>
-                <a:shade val="99000"/>
-                <a:satMod val="350000"/>
-              </a:schemeClr>
-            </a:gs>
-            <a:gs pos="100000">
-              <a:schemeClr val="phClr">
-                <a:shade val="20000"/>
-                <a:satMod val="255000"/>
-              </a:schemeClr>
-            </a:gs>
-          </a:gsLst>
-          <a:path path="circle">
-            <a:fillToRect l="50000" t="-80000" r="50000" b="180000"/>
-          </a:path>
-        </a:gradFill>
-        <a:gradFill rotWithShape="1">
-          <a:gsLst>
-            <a:gs pos="0">
-              <a:schemeClr val="phClr">
-                <a:tint val="80000"/>
-                <a:satMod val="300000"/>
-              </a:schemeClr>
-            </a:gs>
-            <a:gs pos="100000">
-              <a:schemeClr val="phClr">
-                <a:shade val="30000"/>
-                <a:satMod val="200000"/>
-              </a:schemeClr>
-            </a:gs>
-          </a:gsLst>
-          <a:path path="circle">
-            <a:fillToRect l="50000" t="50000" r="50000" b="50000"/>
-          </a:path>
-        </a:gradFill>
-      </a:bgFillStyleLst>
-    </a:fmtScheme>
-  </a:themeElements>
-</a:theme>
 </file>
</xml_diff>

<commit_message>
Update decks to add new project Polycephaly
Signed-off-by: John Mertic <jmertic@linuxfoundation.org>
</commit_message>
<xml_diff>
--- a/overview_deck/zorow_overview_deck.pptx
+++ b/overview_deck/zorow_overview_deck.pptx
@@ -2245,7 +2245,7 @@
   <p:cSld>
     <p:spTree>
       <p:nvGrpSpPr>
-        <p:cNvPr id="99" name="Shape 99"/>
+        <p:cNvPr id="101" name="Shape 101"/>
         <p:cNvGrpSpPr/>
         <p:nvPr/>
       </p:nvGrpSpPr>
@@ -2259,7 +2259,7 @@
       </p:grpSpPr>
       <p:sp>
         <p:nvSpPr>
-          <p:cNvPr id="100" name="Google Shape;100;g646d619067_0_17:notes"/>
+          <p:cNvPr id="102" name="Google Shape;102;g646d619067_0_17:notes"/>
           <p:cNvSpPr/>
           <p:nvPr>
             <p:ph idx="2" type="sldImg"/>
@@ -2294,7 +2294,7 @@
       </p:sp>
       <p:sp>
         <p:nvSpPr>
-          <p:cNvPr id="101" name="Google Shape;101;g646d619067_0_17:notes"/>
+          <p:cNvPr id="103" name="Google Shape;103;g646d619067_0_17:notes"/>
           <p:cNvSpPr txBox="1"/>
           <p:nvPr>
             <p:ph idx="1" type="body"/>
@@ -2348,7 +2348,7 @@
   <p:cSld>
     <p:spTree>
       <p:nvGrpSpPr>
-        <p:cNvPr id="141" name="Shape 141"/>
+        <p:cNvPr id="143" name="Shape 143"/>
         <p:cNvGrpSpPr/>
         <p:nvPr/>
       </p:nvGrpSpPr>
@@ -2362,7 +2362,7 @@
       </p:grpSpPr>
       <p:sp>
         <p:nvSpPr>
-          <p:cNvPr id="142" name="Google Shape;142;g646d619067_0_59:notes"/>
+          <p:cNvPr id="144" name="Google Shape;144;g646d619067_0_59:notes"/>
           <p:cNvSpPr txBox="1"/>
           <p:nvPr>
             <p:ph idx="1" type="body"/>
@@ -2410,7 +2410,7 @@
       </p:sp>
       <p:sp>
         <p:nvSpPr>
-          <p:cNvPr id="143" name="Google Shape;143;g646d619067_0_59:notes"/>
+          <p:cNvPr id="145" name="Google Shape;145;g646d619067_0_59:notes"/>
           <p:cNvSpPr/>
           <p:nvPr>
             <p:ph idx="2" type="sldImg"/>
@@ -8388,10 +8388,10 @@
         </p:nvGrpSpPr>
         <p:grpSpPr>
           <a:xfrm>
-            <a:off x="457200" y="1197413"/>
-            <a:ext cx="8481976" cy="3422818"/>
-            <a:chOff x="457200" y="1197413"/>
-            <a:chExt cx="8481976" cy="3422818"/>
+            <a:off x="268488" y="1197413"/>
+            <a:ext cx="8741935" cy="3422818"/>
+            <a:chOff x="420888" y="1197413"/>
+            <a:chExt cx="8741935" cy="3422818"/>
           </a:xfrm>
         </p:grpSpPr>
         <p:grpSp>
@@ -8402,47 +8402,230 @@
           </p:nvGrpSpPr>
           <p:grpSpPr>
             <a:xfrm>
-              <a:off x="457200" y="1197413"/>
-              <a:ext cx="8479992" cy="3422818"/>
-              <a:chOff x="457200" y="1197413"/>
-              <a:chExt cx="8479992" cy="3422818"/>
+              <a:off x="420888" y="1197413"/>
+              <a:ext cx="8741935" cy="3422818"/>
+              <a:chOff x="420888" y="1197413"/>
+              <a:chExt cx="8741935" cy="3422818"/>
             </a:xfrm>
           </p:grpSpPr>
+          <p:grpSp>
+            <p:nvGrpSpPr>
+              <p:cNvPr id="91" name="Google Shape;91;p10"/>
+              <p:cNvGrpSpPr/>
+              <p:nvPr/>
+            </p:nvGrpSpPr>
+            <p:grpSpPr>
+              <a:xfrm>
+                <a:off x="420888" y="1197413"/>
+                <a:ext cx="8741935" cy="3422818"/>
+                <a:chOff x="420888" y="1197413"/>
+                <a:chExt cx="8741935" cy="3422818"/>
+              </a:xfrm>
+            </p:grpSpPr>
+            <p:pic>
+              <p:nvPicPr>
+                <p:cNvPr id="92" name="Google Shape;92;p10"/>
+                <p:cNvPicPr preferRelativeResize="0"/>
+                <p:nvPr/>
+              </p:nvPicPr>
+              <p:blipFill rotWithShape="1">
+                <a:blip r:embed="rId4">
+                  <a:alphaModFix/>
+                </a:blip>
+                <a:srcRect b="0" l="0" r="0" t="0"/>
+                <a:stretch/>
+              </p:blipFill>
+              <p:spPr>
+                <a:xfrm>
+                  <a:off x="6230172" y="3688794"/>
+                  <a:ext cx="2932651" cy="893550"/>
+                </a:xfrm>
+                <a:prstGeom prst="rect">
+                  <a:avLst/>
+                </a:prstGeom>
+                <a:noFill/>
+                <a:ln>
+                  <a:noFill/>
+                </a:ln>
+              </p:spPr>
+            </p:pic>
+            <p:pic>
+              <p:nvPicPr>
+                <p:cNvPr id="93" name="Google Shape;93;p10"/>
+                <p:cNvPicPr preferRelativeResize="0"/>
+                <p:nvPr/>
+              </p:nvPicPr>
+              <p:blipFill>
+                <a:blip r:embed="rId5">
+                  <a:alphaModFix/>
+                </a:blip>
+                <a:stretch>
+                  <a:fillRect/>
+                </a:stretch>
+              </p:blipFill>
+              <p:spPr>
+                <a:xfrm>
+                  <a:off x="3301407" y="3650931"/>
+                  <a:ext cx="2682626" cy="969301"/>
+                </a:xfrm>
+                <a:prstGeom prst="rect">
+                  <a:avLst/>
+                </a:prstGeom>
+                <a:noFill/>
+                <a:ln>
+                  <a:noFill/>
+                </a:ln>
+              </p:spPr>
+            </p:pic>
+            <p:pic>
+              <p:nvPicPr>
+                <p:cNvPr id="94" name="Google Shape;94;p10"/>
+                <p:cNvPicPr preferRelativeResize="0"/>
+                <p:nvPr/>
+              </p:nvPicPr>
+              <p:blipFill>
+                <a:blip r:embed="rId6">
+                  <a:alphaModFix/>
+                </a:blip>
+                <a:stretch>
+                  <a:fillRect/>
+                </a:stretch>
+              </p:blipFill>
+              <p:spPr>
+                <a:xfrm>
+                  <a:off x="486836" y="2696393"/>
+                  <a:ext cx="2575099" cy="638625"/>
+                </a:xfrm>
+                <a:prstGeom prst="rect">
+                  <a:avLst/>
+                </a:prstGeom>
+                <a:noFill/>
+                <a:ln>
+                  <a:noFill/>
+                </a:ln>
+              </p:spPr>
+            </p:pic>
+            <p:pic>
+              <p:nvPicPr>
+                <p:cNvPr id="95" name="Google Shape;95;p10"/>
+                <p:cNvPicPr preferRelativeResize="0"/>
+                <p:nvPr/>
+              </p:nvPicPr>
+              <p:blipFill>
+                <a:blip r:embed="rId7">
+                  <a:alphaModFix/>
+                </a:blip>
+                <a:stretch>
+                  <a:fillRect/>
+                </a:stretch>
+              </p:blipFill>
+              <p:spPr>
+                <a:xfrm>
+                  <a:off x="420888" y="3750806"/>
+                  <a:ext cx="2634370" cy="769551"/>
+                </a:xfrm>
+                <a:prstGeom prst="rect">
+                  <a:avLst/>
+                </a:prstGeom>
+                <a:noFill/>
+                <a:ln>
+                  <a:noFill/>
+                </a:ln>
+              </p:spPr>
+            </p:pic>
+            <p:pic>
+              <p:nvPicPr>
+                <p:cNvPr id="96" name="Google Shape;96;p10"/>
+                <p:cNvPicPr preferRelativeResize="0"/>
+                <p:nvPr/>
+              </p:nvPicPr>
+              <p:blipFill>
+                <a:blip r:embed="rId8">
+                  <a:alphaModFix/>
+                </a:blip>
+                <a:stretch>
+                  <a:fillRect/>
+                </a:stretch>
+              </p:blipFill>
+              <p:spPr>
+                <a:xfrm>
+                  <a:off x="3224782" y="1197413"/>
+                  <a:ext cx="2835875" cy="1136400"/>
+                </a:xfrm>
+                <a:prstGeom prst="rect">
+                  <a:avLst/>
+                </a:prstGeom>
+                <a:noFill/>
+                <a:ln>
+                  <a:noFill/>
+                </a:ln>
+              </p:spPr>
+            </p:pic>
+            <p:pic>
+              <p:nvPicPr>
+                <p:cNvPr id="97" name="Google Shape;97;p10"/>
+                <p:cNvPicPr preferRelativeResize="0"/>
+                <p:nvPr/>
+              </p:nvPicPr>
+              <p:blipFill>
+                <a:blip r:embed="rId9">
+                  <a:alphaModFix/>
+                </a:blip>
+                <a:stretch>
+                  <a:fillRect/>
+                </a:stretch>
+              </p:blipFill>
+              <p:spPr>
+                <a:xfrm>
+                  <a:off x="457200" y="1362002"/>
+                  <a:ext cx="2634374" cy="828774"/>
+                </a:xfrm>
+                <a:prstGeom prst="rect">
+                  <a:avLst/>
+                </a:prstGeom>
+                <a:noFill/>
+                <a:ln>
+                  <a:noFill/>
+                </a:ln>
+              </p:spPr>
+            </p:pic>
+            <p:pic>
+              <p:nvPicPr>
+                <p:cNvPr id="98" name="Google Shape;98;p10"/>
+                <p:cNvPicPr preferRelativeResize="0"/>
+                <p:nvPr/>
+              </p:nvPicPr>
+              <p:blipFill>
+                <a:blip r:embed="rId10">
+                  <a:alphaModFix/>
+                </a:blip>
+                <a:stretch>
+                  <a:fillRect/>
+                </a:stretch>
+              </p:blipFill>
+              <p:spPr>
+                <a:xfrm>
+                  <a:off x="3287391" y="2769230"/>
+                  <a:ext cx="2710658" cy="492950"/>
+                </a:xfrm>
+                <a:prstGeom prst="rect">
+                  <a:avLst/>
+                </a:prstGeom>
+                <a:noFill/>
+                <a:ln>
+                  <a:noFill/>
+                </a:ln>
+              </p:spPr>
+            </p:pic>
+          </p:grpSp>
           <p:pic>
             <p:nvPicPr>
-              <p:cNvPr id="91" name="Google Shape;91;p10"/>
-              <p:cNvPicPr preferRelativeResize="0"/>
-              <p:nvPr/>
-            </p:nvPicPr>
-            <p:blipFill rotWithShape="1">
-              <a:blip r:embed="rId4">
-                <a:alphaModFix/>
-              </a:blip>
-              <a:srcRect b="0" l="0" r="0" t="0"/>
-              <a:stretch/>
-            </p:blipFill>
-            <p:spPr>
-              <a:xfrm>
-                <a:off x="4929820" y="3688794"/>
-                <a:ext cx="2932651" cy="893550"/>
-              </a:xfrm>
-              <a:prstGeom prst="rect">
-                <a:avLst/>
-              </a:prstGeom>
-              <a:noFill/>
-              <a:ln>
-                <a:noFill/>
-              </a:ln>
-            </p:spPr>
-          </p:pic>
-          <p:pic>
-            <p:nvPicPr>
-              <p:cNvPr id="92" name="Google Shape;92;p10"/>
+              <p:cNvPr id="99" name="Google Shape;99;p10"/>
               <p:cNvPicPr preferRelativeResize="0"/>
               <p:nvPr/>
             </p:nvPicPr>
             <p:blipFill>
-              <a:blip r:embed="rId5">
+              <a:blip r:embed="rId11">
                 <a:alphaModFix/>
               </a:blip>
               <a:stretch>
@@ -8451,148 +8634,8 @@
             </p:blipFill>
             <p:spPr>
               <a:xfrm>
-                <a:off x="1755833" y="3650931"/>
-                <a:ext cx="2682626" cy="969301"/>
-              </a:xfrm>
-              <a:prstGeom prst="rect">
-                <a:avLst/>
-              </a:prstGeom>
-              <a:noFill/>
-              <a:ln>
-                <a:noFill/>
-              </a:ln>
-            </p:spPr>
-          </p:pic>
-          <p:pic>
-            <p:nvPicPr>
-              <p:cNvPr id="93" name="Google Shape;93;p10"/>
-              <p:cNvPicPr preferRelativeResize="0"/>
-              <p:nvPr/>
-            </p:nvPicPr>
-            <p:blipFill>
-              <a:blip r:embed="rId6">
-                <a:alphaModFix/>
-              </a:blip>
-              <a:stretch>
-                <a:fillRect/>
-              </a:stretch>
-            </p:blipFill>
-            <p:spPr>
-              <a:xfrm>
-                <a:off x="486836" y="2775687"/>
-                <a:ext cx="2575099" cy="638625"/>
-              </a:xfrm>
-              <a:prstGeom prst="rect">
-                <a:avLst/>
-              </a:prstGeom>
-              <a:noFill/>
-              <a:ln>
-                <a:noFill/>
-              </a:ln>
-            </p:spPr>
-          </p:pic>
-          <p:pic>
-            <p:nvPicPr>
-              <p:cNvPr id="94" name="Google Shape;94;p10"/>
-              <p:cNvPicPr preferRelativeResize="0"/>
-              <p:nvPr/>
-            </p:nvPicPr>
-            <p:blipFill>
-              <a:blip r:embed="rId7">
-                <a:alphaModFix/>
-              </a:blip>
-              <a:stretch>
-                <a:fillRect/>
-              </a:stretch>
-            </p:blipFill>
-            <p:spPr>
-              <a:xfrm>
-                <a:off x="6302823" y="2710231"/>
-                <a:ext cx="2634370" cy="769551"/>
-              </a:xfrm>
-              <a:prstGeom prst="rect">
-                <a:avLst/>
-              </a:prstGeom>
-              <a:noFill/>
-              <a:ln>
-                <a:noFill/>
-              </a:ln>
-            </p:spPr>
-          </p:pic>
-          <p:pic>
-            <p:nvPicPr>
-              <p:cNvPr id="95" name="Google Shape;95;p10"/>
-              <p:cNvPicPr preferRelativeResize="0"/>
-              <p:nvPr/>
-            </p:nvPicPr>
-            <p:blipFill>
-              <a:blip r:embed="rId8">
-                <a:alphaModFix/>
-              </a:blip>
-              <a:stretch>
-                <a:fillRect/>
-              </a:stretch>
-            </p:blipFill>
-            <p:spPr>
-              <a:xfrm>
-                <a:off x="3224782" y="1197413"/>
-                <a:ext cx="2835875" cy="1136400"/>
-              </a:xfrm>
-              <a:prstGeom prst="rect">
-                <a:avLst/>
-              </a:prstGeom>
-              <a:noFill/>
-              <a:ln>
-                <a:noFill/>
-              </a:ln>
-            </p:spPr>
-          </p:pic>
-          <p:pic>
-            <p:nvPicPr>
-              <p:cNvPr id="96" name="Google Shape;96;p10"/>
-              <p:cNvPicPr preferRelativeResize="0"/>
-              <p:nvPr/>
-            </p:nvPicPr>
-            <p:blipFill>
-              <a:blip r:embed="rId9">
-                <a:alphaModFix/>
-              </a:blip>
-              <a:stretch>
-                <a:fillRect/>
-              </a:stretch>
-            </p:blipFill>
-            <p:spPr>
-              <a:xfrm>
-                <a:off x="457200" y="1362002"/>
-                <a:ext cx="2634374" cy="828774"/>
-              </a:xfrm>
-              <a:prstGeom prst="rect">
-                <a:avLst/>
-              </a:prstGeom>
-              <a:noFill/>
-              <a:ln>
-                <a:noFill/>
-              </a:ln>
-            </p:spPr>
-          </p:pic>
-          <p:pic>
-            <p:nvPicPr>
-              <p:cNvPr id="97" name="Google Shape;97;p10"/>
-              <p:cNvPicPr preferRelativeResize="0"/>
-              <p:nvPr/>
-            </p:nvPicPr>
-            <p:blipFill>
-              <a:blip r:embed="rId10">
-                <a:alphaModFix/>
-              </a:blip>
-              <a:stretch>
-                <a:fillRect/>
-              </a:stretch>
-            </p:blipFill>
-            <p:spPr>
-              <a:xfrm>
-                <a:off x="3322792" y="2848531"/>
-                <a:ext cx="2710658" cy="492950"/>
+                <a:off x="6377335" y="1412665"/>
+                <a:ext cx="2638326" cy="727450"/>
               </a:xfrm>
               <a:prstGeom prst="rect">
                 <a:avLst/>
@@ -8606,12 +8649,12 @@
         </p:grpSp>
         <p:pic>
           <p:nvPicPr>
-            <p:cNvPr id="98" name="Google Shape;98;p10"/>
+            <p:cNvPr id="100" name="Google Shape;100;p10"/>
             <p:cNvPicPr preferRelativeResize="0"/>
             <p:nvPr/>
           </p:nvPicPr>
           <p:blipFill>
-            <a:blip r:embed="rId11">
+            <a:blip r:embed="rId12">
               <a:alphaModFix/>
             </a:blip>
             <a:stretch>
@@ -8620,8 +8663,8 @@
           </p:blipFill>
           <p:spPr>
             <a:xfrm>
-              <a:off x="6300850" y="1412665"/>
-              <a:ext cx="2638326" cy="727450"/>
+              <a:off x="6282226" y="2723980"/>
+              <a:ext cx="2861777" cy="583450"/>
             </a:xfrm>
             <a:prstGeom prst="rect">
               <a:avLst/>
@@ -8646,7 +8689,7 @@
   <p:cSld>
     <p:spTree>
       <p:nvGrpSpPr>
-        <p:cNvPr id="102" name="Shape 102"/>
+        <p:cNvPr id="104" name="Shape 104"/>
         <p:cNvGrpSpPr/>
         <p:nvPr/>
       </p:nvGrpSpPr>
@@ -8660,7 +8703,7 @@
       </p:grpSpPr>
       <p:sp>
         <p:nvSpPr>
-          <p:cNvPr id="103" name="Google Shape;103;p11"/>
+          <p:cNvPr id="105" name="Google Shape;105;p11"/>
           <p:cNvSpPr txBox="1"/>
           <p:nvPr>
             <p:ph type="title"/>
@@ -8704,7 +8747,7 @@
       </p:sp>
       <p:sp>
         <p:nvSpPr>
-          <p:cNvPr id="104" name="Google Shape;104;p11"/>
+          <p:cNvPr id="106" name="Google Shape;106;p11"/>
           <p:cNvSpPr txBox="1"/>
           <p:nvPr>
             <p:ph idx="12" type="sldNum"/>
@@ -8765,7 +8808,7 @@
       </p:sp>
       <p:grpSp>
         <p:nvGrpSpPr>
-          <p:cNvPr id="105" name="Google Shape;105;p11"/>
+          <p:cNvPr id="107" name="Google Shape;107;p11"/>
           <p:cNvGrpSpPr/>
           <p:nvPr/>
         </p:nvGrpSpPr>
@@ -8779,7 +8822,7 @@
         </p:grpSpPr>
         <p:grpSp>
           <p:nvGrpSpPr>
-            <p:cNvPr id="106" name="Google Shape;106;p11"/>
+            <p:cNvPr id="108" name="Google Shape;108;p11"/>
             <p:cNvGrpSpPr/>
             <p:nvPr/>
           </p:nvGrpSpPr>
@@ -8793,7 +8836,7 @@
           </p:grpSpPr>
           <p:grpSp>
             <p:nvGrpSpPr>
-              <p:cNvPr id="107" name="Google Shape;107;p11"/>
+              <p:cNvPr id="109" name="Google Shape;109;p11"/>
               <p:cNvGrpSpPr/>
               <p:nvPr/>
             </p:nvGrpSpPr>
@@ -8807,7 +8850,7 @@
             </p:grpSpPr>
             <p:pic>
               <p:nvPicPr>
-                <p:cNvPr id="108" name="Google Shape;108;p11"/>
+                <p:cNvPr id="110" name="Google Shape;110;p11"/>
                 <p:cNvPicPr preferRelativeResize="0"/>
                 <p:nvPr/>
               </p:nvPicPr>
@@ -8834,7 +8877,7 @@
             </p:pic>
             <p:pic>
               <p:nvPicPr>
-                <p:cNvPr descr="Logo Image" id="109" name="Google Shape;109;p11"/>
+                <p:cNvPr descr="Logo Image" id="111" name="Google Shape;111;p11"/>
                 <p:cNvPicPr preferRelativeResize="0"/>
                 <p:nvPr/>
               </p:nvPicPr>
@@ -8861,7 +8904,7 @@
             </p:pic>
             <p:pic>
               <p:nvPicPr>
-                <p:cNvPr descr="Logo Image" id="110" name="Google Shape;110;p11"/>
+                <p:cNvPr descr="Logo Image" id="112" name="Google Shape;112;p11"/>
                 <p:cNvPicPr preferRelativeResize="0"/>
                 <p:nvPr/>
               </p:nvPicPr>
@@ -8888,7 +8931,7 @@
             </p:pic>
             <p:pic>
               <p:nvPicPr>
-                <p:cNvPr descr="Logo Image" id="111" name="Google Shape;111;p11"/>
+                <p:cNvPr descr="Logo Image" id="113" name="Google Shape;113;p11"/>
                 <p:cNvPicPr preferRelativeResize="0"/>
                 <p:nvPr/>
               </p:nvPicPr>
@@ -8915,7 +8958,7 @@
             </p:pic>
             <p:pic>
               <p:nvPicPr>
-                <p:cNvPr descr="Logo Image" id="112" name="Google Shape;112;p11"/>
+                <p:cNvPr descr="Logo Image" id="114" name="Google Shape;114;p11"/>
                 <p:cNvPicPr preferRelativeResize="0"/>
                 <p:nvPr/>
               </p:nvPicPr>
@@ -8942,7 +8985,7 @@
             </p:pic>
             <p:pic>
               <p:nvPicPr>
-                <p:cNvPr descr="Logo Image" id="113" name="Google Shape;113;p11"/>
+                <p:cNvPr descr="Logo Image" id="115" name="Google Shape;115;p11"/>
                 <p:cNvPicPr preferRelativeResize="0"/>
                 <p:nvPr/>
               </p:nvPicPr>
@@ -8969,7 +9012,7 @@
             </p:pic>
             <p:pic>
               <p:nvPicPr>
-                <p:cNvPr descr="Logo Image" id="114" name="Google Shape;114;p11"/>
+                <p:cNvPr descr="Logo Image" id="116" name="Google Shape;116;p11"/>
                 <p:cNvPicPr preferRelativeResize="0"/>
                 <p:nvPr/>
               </p:nvPicPr>
@@ -8996,7 +9039,7 @@
             </p:pic>
             <p:pic>
               <p:nvPicPr>
-                <p:cNvPr descr="Logo Image" id="115" name="Google Shape;115;p11"/>
+                <p:cNvPr descr="Logo Image" id="117" name="Google Shape;117;p11"/>
                 <p:cNvPicPr preferRelativeResize="0"/>
                 <p:nvPr/>
               </p:nvPicPr>
@@ -9023,7 +9066,7 @@
             </p:pic>
             <p:pic>
               <p:nvPicPr>
-                <p:cNvPr descr="Logo Image" id="116" name="Google Shape;116;p11"/>
+                <p:cNvPr descr="Logo Image" id="118" name="Google Shape;118;p11"/>
                 <p:cNvPicPr preferRelativeResize="0"/>
                 <p:nvPr/>
               </p:nvPicPr>
@@ -9050,7 +9093,7 @@
             </p:pic>
             <p:pic>
               <p:nvPicPr>
-                <p:cNvPr descr="Logo Image" id="117" name="Google Shape;117;p11"/>
+                <p:cNvPr descr="Logo Image" id="119" name="Google Shape;119;p11"/>
                 <p:cNvPicPr preferRelativeResize="0"/>
                 <p:nvPr/>
               </p:nvPicPr>
@@ -9077,7 +9120,7 @@
             </p:pic>
             <p:pic>
               <p:nvPicPr>
-                <p:cNvPr descr="Logo Image" id="118" name="Google Shape;118;p11"/>
+                <p:cNvPr descr="Logo Image" id="120" name="Google Shape;120;p11"/>
                 <p:cNvPicPr preferRelativeResize="0"/>
                 <p:nvPr/>
               </p:nvPicPr>
@@ -9104,7 +9147,7 @@
             </p:pic>
             <p:pic>
               <p:nvPicPr>
-                <p:cNvPr descr="Logo Image" id="119" name="Google Shape;119;p11"/>
+                <p:cNvPr descr="Logo Image" id="121" name="Google Shape;121;p11"/>
                 <p:cNvPicPr preferRelativeResize="0"/>
                 <p:nvPr/>
               </p:nvPicPr>
@@ -9131,7 +9174,7 @@
             </p:pic>
             <p:pic>
               <p:nvPicPr>
-                <p:cNvPr descr="Logo Image" id="120" name="Google Shape;120;p11"/>
+                <p:cNvPr descr="Logo Image" id="122" name="Google Shape;122;p11"/>
                 <p:cNvPicPr preferRelativeResize="0"/>
                 <p:nvPr/>
               </p:nvPicPr>
@@ -9158,7 +9201,7 @@
             </p:pic>
             <p:pic>
               <p:nvPicPr>
-                <p:cNvPr descr="Logo Image" id="121" name="Google Shape;121;p11"/>
+                <p:cNvPr descr="Logo Image" id="123" name="Google Shape;123;p11"/>
                 <p:cNvPicPr preferRelativeResize="0"/>
                 <p:nvPr/>
               </p:nvPicPr>
@@ -9185,7 +9228,7 @@
             </p:pic>
             <p:pic>
               <p:nvPicPr>
-                <p:cNvPr descr="Logo Image" id="122" name="Google Shape;122;p11"/>
+                <p:cNvPr descr="Logo Image" id="124" name="Google Shape;124;p11"/>
                 <p:cNvPicPr preferRelativeResize="0"/>
                 <p:nvPr/>
               </p:nvPicPr>
@@ -9212,7 +9255,7 @@
             </p:pic>
             <p:pic>
               <p:nvPicPr>
-                <p:cNvPr descr="Logo Image" id="123" name="Google Shape;123;p11"/>
+                <p:cNvPr descr="Logo Image" id="125" name="Google Shape;125;p11"/>
                 <p:cNvPicPr preferRelativeResize="0"/>
                 <p:nvPr/>
               </p:nvPicPr>
@@ -9239,7 +9282,7 @@
             </p:pic>
             <p:pic>
               <p:nvPicPr>
-                <p:cNvPr descr="Logo Image" id="124" name="Google Shape;124;p11"/>
+                <p:cNvPr descr="Logo Image" id="126" name="Google Shape;126;p11"/>
                 <p:cNvPicPr preferRelativeResize="0"/>
                 <p:nvPr/>
               </p:nvPicPr>
@@ -9266,7 +9309,7 @@
             </p:pic>
             <p:pic>
               <p:nvPicPr>
-                <p:cNvPr descr="Logo Image" id="125" name="Google Shape;125;p11"/>
+                <p:cNvPr descr="Logo Image" id="127" name="Google Shape;127;p11"/>
                 <p:cNvPicPr preferRelativeResize="0"/>
                 <p:nvPr/>
               </p:nvPicPr>
@@ -9293,7 +9336,7 @@
             </p:pic>
             <p:pic>
               <p:nvPicPr>
-                <p:cNvPr descr="Logo Image" id="126" name="Google Shape;126;p11"/>
+                <p:cNvPr descr="Logo Image" id="128" name="Google Shape;128;p11"/>
                 <p:cNvPicPr preferRelativeResize="0"/>
                 <p:nvPr/>
               </p:nvPicPr>
@@ -9320,7 +9363,7 @@
             </p:pic>
             <p:pic>
               <p:nvPicPr>
-                <p:cNvPr descr="Logo Image" id="127" name="Google Shape;127;p11"/>
+                <p:cNvPr descr="Logo Image" id="129" name="Google Shape;129;p11"/>
                 <p:cNvPicPr preferRelativeResize="0"/>
                 <p:nvPr/>
               </p:nvPicPr>
@@ -9347,7 +9390,7 @@
             </p:pic>
             <p:pic>
               <p:nvPicPr>
-                <p:cNvPr descr="Logo Image" id="128" name="Google Shape;128;p11"/>
+                <p:cNvPr descr="Logo Image" id="130" name="Google Shape;130;p11"/>
                 <p:cNvPicPr preferRelativeResize="0"/>
                 <p:nvPr/>
               </p:nvPicPr>
@@ -9374,7 +9417,7 @@
             </p:pic>
             <p:pic>
               <p:nvPicPr>
-                <p:cNvPr descr="Logo Image" id="129" name="Google Shape;129;p11"/>
+                <p:cNvPr descr="Logo Image" id="131" name="Google Shape;131;p11"/>
                 <p:cNvPicPr preferRelativeResize="0"/>
                 <p:nvPr/>
               </p:nvPicPr>
@@ -9401,7 +9444,7 @@
             </p:pic>
             <p:pic>
               <p:nvPicPr>
-                <p:cNvPr descr="Logo Image" id="130" name="Google Shape;130;p11"/>
+                <p:cNvPr descr="Logo Image" id="132" name="Google Shape;132;p11"/>
                 <p:cNvPicPr preferRelativeResize="0"/>
                 <p:nvPr/>
               </p:nvPicPr>
@@ -9428,7 +9471,7 @@
             </p:pic>
             <p:pic>
               <p:nvPicPr>
-                <p:cNvPr id="131" name="Google Shape;131;p11"/>
+                <p:cNvPr id="133" name="Google Shape;133;p11"/>
                 <p:cNvPicPr preferRelativeResize="0"/>
                 <p:nvPr/>
               </p:nvPicPr>
@@ -9455,7 +9498,7 @@
             </p:pic>
             <p:pic>
               <p:nvPicPr>
-                <p:cNvPr id="132" name="Google Shape;132;p11"/>
+                <p:cNvPr id="134" name="Google Shape;134;p11"/>
                 <p:cNvPicPr preferRelativeResize="0"/>
                 <p:nvPr/>
               </p:nvPicPr>
@@ -9482,7 +9525,7 @@
             </p:pic>
             <p:pic>
               <p:nvPicPr>
-                <p:cNvPr id="133" name="Google Shape;133;p11"/>
+                <p:cNvPr id="135" name="Google Shape;135;p11"/>
                 <p:cNvPicPr preferRelativeResize="0"/>
                 <p:nvPr/>
               </p:nvPicPr>
@@ -9509,7 +9552,7 @@
             </p:pic>
             <p:pic>
               <p:nvPicPr>
-                <p:cNvPr id="134" name="Google Shape;134;p11"/>
+                <p:cNvPr id="136" name="Google Shape;136;p11"/>
                 <p:cNvPicPr preferRelativeResize="0"/>
                 <p:nvPr/>
               </p:nvPicPr>
@@ -9537,7 +9580,7 @@
             </p:pic>
             <p:pic>
               <p:nvPicPr>
-                <p:cNvPr id="135" name="Google Shape;135;p11"/>
+                <p:cNvPr id="137" name="Google Shape;137;p11"/>
                 <p:cNvPicPr preferRelativeResize="0"/>
                 <p:nvPr/>
               </p:nvPicPr>
@@ -9565,7 +9608,7 @@
             </p:pic>
             <p:pic>
               <p:nvPicPr>
-                <p:cNvPr id="136" name="Google Shape;136;p11"/>
+                <p:cNvPr id="138" name="Google Shape;138;p11"/>
                 <p:cNvPicPr preferRelativeResize="0"/>
                 <p:nvPr/>
               </p:nvPicPr>
@@ -9593,7 +9636,7 @@
             </p:pic>
             <p:sp>
               <p:nvSpPr>
-                <p:cNvPr id="137" name="Google Shape;137;p11"/>
+                <p:cNvPr id="139" name="Google Shape;139;p11"/>
                 <p:cNvSpPr txBox="1"/>
                 <p:nvPr/>
               </p:nvSpPr>
@@ -9645,7 +9688,7 @@
             </p:sp>
             <p:pic>
               <p:nvPicPr>
-                <p:cNvPr id="138" name="Google Shape;138;p11"/>
+                <p:cNvPr id="140" name="Google Shape;140;p11"/>
                 <p:cNvPicPr preferRelativeResize="0"/>
                 <p:nvPr/>
               </p:nvPicPr>
@@ -9674,7 +9717,7 @@
           </p:grpSp>
           <p:pic>
             <p:nvPicPr>
-              <p:cNvPr id="139" name="Google Shape;139;p11"/>
+              <p:cNvPr id="141" name="Google Shape;141;p11"/>
               <p:cNvPicPr preferRelativeResize="0"/>
               <p:nvPr/>
             </p:nvPicPr>
@@ -9703,7 +9746,7 @@
         </p:grpSp>
         <p:pic>
           <p:nvPicPr>
-            <p:cNvPr id="140" name="Google Shape;140;p11"/>
+            <p:cNvPr id="142" name="Google Shape;142;p11"/>
             <p:cNvPicPr preferRelativeResize="0"/>
             <p:nvPr/>
           </p:nvPicPr>
@@ -9743,7 +9786,7 @@
   <p:cSld>
     <p:spTree>
       <p:nvGrpSpPr>
-        <p:cNvPr id="144" name="Shape 144"/>
+        <p:cNvPr id="146" name="Shape 146"/>
         <p:cNvGrpSpPr/>
         <p:nvPr/>
       </p:nvGrpSpPr>
@@ -9757,7 +9800,7 @@
       </p:grpSpPr>
       <p:pic>
         <p:nvPicPr>
-          <p:cNvPr descr="12c copy" id="145" name="Google Shape;145;p12"/>
+          <p:cNvPr descr="12c copy" id="147" name="Google Shape;147;p12"/>
           <p:cNvPicPr preferRelativeResize="0"/>
           <p:nvPr/>
         </p:nvPicPr>
@@ -9784,7 +9827,7 @@
       </p:pic>
       <p:sp>
         <p:nvSpPr>
-          <p:cNvPr id="146" name="Google Shape;146;p12"/>
+          <p:cNvPr id="148" name="Google Shape;148;p12"/>
           <p:cNvSpPr/>
           <p:nvPr/>
         </p:nvSpPr>
@@ -9853,7 +9896,7 @@
       </p:sp>
       <p:sp>
         <p:nvSpPr>
-          <p:cNvPr id="147" name="Google Shape;147;p12"/>
+          <p:cNvPr id="149" name="Google Shape;149;p12"/>
           <p:cNvSpPr/>
           <p:nvPr/>
         </p:nvSpPr>
@@ -9912,7 +9955,7 @@
       </p:sp>
       <p:sp>
         <p:nvSpPr>
-          <p:cNvPr id="148" name="Google Shape;148;p12"/>
+          <p:cNvPr id="150" name="Google Shape;150;p12"/>
           <p:cNvSpPr txBox="1"/>
           <p:nvPr>
             <p:ph idx="1" type="body"/>
@@ -10065,7 +10108,7 @@
       </p:sp>
       <p:pic>
         <p:nvPicPr>
-          <p:cNvPr descr="OpenMainframe_Logo_Pantone.png" id="149" name="Google Shape;149;p12"/>
+          <p:cNvPr descr="OpenMainframe_Logo_Pantone.png" id="151" name="Google Shape;151;p12"/>
           <p:cNvPicPr preferRelativeResize="0"/>
           <p:nvPr/>
         </p:nvPicPr>
@@ -10092,7 +10135,7 @@
       </p:pic>
       <p:sp>
         <p:nvSpPr>
-          <p:cNvPr id="150" name="Google Shape;150;p12"/>
+          <p:cNvPr id="152" name="Google Shape;152;p12"/>
           <p:cNvSpPr/>
           <p:nvPr/>
         </p:nvSpPr>
@@ -10150,7 +10193,7 @@
       </p:sp>
       <p:sp>
         <p:nvSpPr>
-          <p:cNvPr id="151" name="Google Shape;151;p12"/>
+          <p:cNvPr id="153" name="Google Shape;153;p12"/>
           <p:cNvSpPr txBox="1"/>
           <p:nvPr>
             <p:ph idx="12" type="sldNum"/>
@@ -10225,6 +10268,285 @@
 </file>
 
 <file path=ppt/theme/theme1.xml><?xml version="1.0" encoding="utf-8"?>
+<a:theme xmlns:a="http://schemas.openxmlformats.org/drawingml/2006/main" xmlns:r="http://schemas.openxmlformats.org/officeDocument/2006/relationships" name="Office Theme">
+  <a:themeElements>
+    <a:clrScheme name="Office">
+      <a:dk1>
+        <a:srgbClr val="000000"/>
+      </a:dk1>
+      <a:lt1>
+        <a:srgbClr val="FFFFFF"/>
+      </a:lt1>
+      <a:dk2>
+        <a:srgbClr val="44546A"/>
+      </a:dk2>
+      <a:lt2>
+        <a:srgbClr val="E7E6E6"/>
+      </a:lt2>
+      <a:accent1>
+        <a:srgbClr val="5B9BD5"/>
+      </a:accent1>
+      <a:accent2>
+        <a:srgbClr val="ED7D31"/>
+      </a:accent2>
+      <a:accent3>
+        <a:srgbClr val="A5A5A5"/>
+      </a:accent3>
+      <a:accent4>
+        <a:srgbClr val="FFC000"/>
+      </a:accent4>
+      <a:accent5>
+        <a:srgbClr val="4472C4"/>
+      </a:accent5>
+      <a:accent6>
+        <a:srgbClr val="70AD47"/>
+      </a:accent6>
+      <a:hlink>
+        <a:srgbClr val="0563C1"/>
+      </a:hlink>
+      <a:folHlink>
+        <a:srgbClr val="954F72"/>
+      </a:folHlink>
+    </a:clrScheme>
+    <a:fontScheme name="Office">
+      <a:majorFont>
+        <a:latin typeface="Arial"/>
+        <a:ea typeface=""/>
+        <a:cs typeface=""/>
+        <a:font script="Jpan" typeface="ＭＳ Ｐゴシック"/>
+        <a:font script="Hang" typeface="맑은 고딕"/>
+        <a:font script="Hans" typeface="宋体"/>
+        <a:font script="Hant" typeface="新細明體"/>
+        <a:font script="Arab" typeface="Times New Roman"/>
+        <a:font script="Hebr" typeface="Times New Roman"/>
+        <a:font script="Thai" typeface="Angsana New"/>
+        <a:font script="Ethi" typeface="Nyala"/>
+        <a:font script="Beng" typeface="Vrinda"/>
+        <a:font script="Gujr" typeface="Shruti"/>
+        <a:font script="Khmr" typeface="MoolBoran"/>
+        <a:font script="Knda" typeface="Tunga"/>
+        <a:font script="Guru" typeface="Raavi"/>
+        <a:font script="Cans" typeface="Euphemia"/>
+        <a:font script="Cher" typeface="Plantagenet Cherokee"/>
+        <a:font script="Yiii" typeface="Microsoft Yi Baiti"/>
+        <a:font script="Tibt" typeface="Microsoft Himalaya"/>
+        <a:font script="Thaa" typeface="MV Boli"/>
+        <a:font script="Deva" typeface="Mangal"/>
+        <a:font script="Telu" typeface="Gautami"/>
+        <a:font script="Taml" typeface="Latha"/>
+        <a:font script="Syrc" typeface="Estrangelo Edessa"/>
+        <a:font script="Orya" typeface="Kalinga"/>
+        <a:font script="Mlym" typeface="Kartika"/>
+        <a:font script="Laoo" typeface="DokChampa"/>
+        <a:font script="Sinh" typeface="Iskoola Pota"/>
+        <a:font script="Mong" typeface="Mongolian Baiti"/>
+        <a:font script="Viet" typeface="Times New Roman"/>
+        <a:font script="Uigh" typeface="Microsoft Uighur"/>
+        <a:font script="Geor" typeface="Sylfaen"/>
+      </a:majorFont>
+      <a:minorFont>
+        <a:latin typeface="Arial"/>
+        <a:ea typeface=""/>
+        <a:cs typeface=""/>
+        <a:font script="Jpan" typeface="ＭＳ Ｐゴシック"/>
+        <a:font script="Hang" typeface="맑은 고딕"/>
+        <a:font script="Hans" typeface="宋体"/>
+        <a:font script="Hant" typeface="新細明體"/>
+        <a:font script="Arab" typeface="Arial"/>
+        <a:font script="Hebr" typeface="Arial"/>
+        <a:font script="Thai" typeface="Cordia New"/>
+        <a:font script="Ethi" typeface="Nyala"/>
+        <a:font script="Beng" typeface="Vrinda"/>
+        <a:font script="Gujr" typeface="Shruti"/>
+        <a:font script="Khmr" typeface="DaunPenh"/>
+        <a:font script="Knda" typeface="Tunga"/>
+        <a:font script="Guru" typeface="Raavi"/>
+        <a:font script="Cans" typeface="Euphemia"/>
+        <a:font script="Cher" typeface="Plantagenet Cherokee"/>
+        <a:font script="Yiii" typeface="Microsoft Yi Baiti"/>
+        <a:font script="Tibt" typeface="Microsoft Himalaya"/>
+        <a:font script="Thaa" typeface="MV Boli"/>
+        <a:font script="Deva" typeface="Mangal"/>
+        <a:font script="Telu" typeface="Gautami"/>
+        <a:font script="Taml" typeface="Latha"/>
+        <a:font script="Syrc" typeface="Estrangelo Edessa"/>
+        <a:font script="Orya" typeface="Kalinga"/>
+        <a:font script="Mlym" typeface="Kartika"/>
+        <a:font script="Laoo" typeface="DokChampa"/>
+        <a:font script="Sinh" typeface="Iskoola Pota"/>
+        <a:font script="Mong" typeface="Mongolian Baiti"/>
+        <a:font script="Viet" typeface="Arial"/>
+        <a:font script="Uigh" typeface="Microsoft Uighur"/>
+        <a:font script="Geor" typeface="Sylfaen"/>
+      </a:minorFont>
+    </a:fontScheme>
+    <a:fmtScheme name="Office">
+      <a:fillStyleLst>
+        <a:solidFill>
+          <a:schemeClr val="phClr"/>
+        </a:solidFill>
+        <a:gradFill rotWithShape="1">
+          <a:gsLst>
+            <a:gs pos="0">
+              <a:schemeClr val="phClr">
+                <a:tint val="50000"/>
+                <a:satMod val="300000"/>
+              </a:schemeClr>
+            </a:gs>
+            <a:gs pos="35000">
+              <a:schemeClr val="phClr">
+                <a:tint val="37000"/>
+                <a:satMod val="300000"/>
+              </a:schemeClr>
+            </a:gs>
+            <a:gs pos="100000">
+              <a:schemeClr val="phClr">
+                <a:tint val="15000"/>
+                <a:satMod val="350000"/>
+              </a:schemeClr>
+            </a:gs>
+          </a:gsLst>
+          <a:lin ang="16200000" scaled="1"/>
+        </a:gradFill>
+        <a:gradFill rotWithShape="1">
+          <a:gsLst>
+            <a:gs pos="0">
+              <a:schemeClr val="phClr">
+                <a:tint val="100000"/>
+                <a:shade val="100000"/>
+                <a:satMod val="130000"/>
+              </a:schemeClr>
+            </a:gs>
+            <a:gs pos="100000">
+              <a:schemeClr val="phClr">
+                <a:tint val="50000"/>
+                <a:shade val="100000"/>
+                <a:satMod val="350000"/>
+              </a:schemeClr>
+            </a:gs>
+          </a:gsLst>
+          <a:lin ang="16200000" scaled="0"/>
+        </a:gradFill>
+      </a:fillStyleLst>
+      <a:lnStyleLst>
+        <a:ln w="9525" cap="flat" cmpd="sng" algn="ctr">
+          <a:solidFill>
+            <a:schemeClr val="phClr">
+              <a:shade val="95000"/>
+              <a:satMod val="105000"/>
+            </a:schemeClr>
+          </a:solidFill>
+          <a:prstDash val="solid"/>
+        </a:ln>
+        <a:ln w="25400" cap="flat" cmpd="sng" algn="ctr">
+          <a:solidFill>
+            <a:schemeClr val="phClr"/>
+          </a:solidFill>
+          <a:prstDash val="solid"/>
+        </a:ln>
+        <a:ln w="38100" cap="flat" cmpd="sng" algn="ctr">
+          <a:solidFill>
+            <a:schemeClr val="phClr"/>
+          </a:solidFill>
+          <a:prstDash val="solid"/>
+        </a:ln>
+      </a:lnStyleLst>
+      <a:effectStyleLst>
+        <a:effectStyle>
+          <a:effectLst>
+            <a:outerShdw blurRad="40000" dist="20000" dir="5400000" rotWithShape="0">
+              <a:srgbClr val="000000">
+                <a:alpha val="38000"/>
+              </a:srgbClr>
+            </a:outerShdw>
+          </a:effectLst>
+        </a:effectStyle>
+        <a:effectStyle>
+          <a:effectLst>
+            <a:outerShdw blurRad="40000" dist="23000" dir="5400000" rotWithShape="0">
+              <a:srgbClr val="000000">
+                <a:alpha val="35000"/>
+              </a:srgbClr>
+            </a:outerShdw>
+          </a:effectLst>
+        </a:effectStyle>
+        <a:effectStyle>
+          <a:effectLst>
+            <a:outerShdw blurRad="40000" dist="23000" dir="5400000" rotWithShape="0">
+              <a:srgbClr val="000000">
+                <a:alpha val="35000"/>
+              </a:srgbClr>
+            </a:outerShdw>
+          </a:effectLst>
+          <a:scene3d>
+            <a:camera prst="orthographicFront">
+              <a:rot lat="0" lon="0" rev="0"/>
+            </a:camera>
+            <a:lightRig rig="threePt" dir="t">
+              <a:rot lat="0" lon="0" rev="1200000"/>
+            </a:lightRig>
+          </a:scene3d>
+          <a:sp3d>
+            <a:bevelT w="63500" h="25400"/>
+          </a:sp3d>
+        </a:effectStyle>
+      </a:effectStyleLst>
+      <a:bgFillStyleLst>
+        <a:solidFill>
+          <a:schemeClr val="phClr"/>
+        </a:solidFill>
+        <a:gradFill rotWithShape="1">
+          <a:gsLst>
+            <a:gs pos="0">
+              <a:schemeClr val="phClr">
+                <a:tint val="40000"/>
+                <a:satMod val="350000"/>
+              </a:schemeClr>
+            </a:gs>
+            <a:gs pos="40000">
+              <a:schemeClr val="phClr">
+                <a:tint val="45000"/>
+                <a:shade val="99000"/>
+                <a:satMod val="350000"/>
+              </a:schemeClr>
+            </a:gs>
+            <a:gs pos="100000">
+              <a:schemeClr val="phClr">
+                <a:shade val="20000"/>
+                <a:satMod val="255000"/>
+              </a:schemeClr>
+            </a:gs>
+          </a:gsLst>
+          <a:path path="circle">
+            <a:fillToRect l="50000" t="-80000" r="50000" b="180000"/>
+          </a:path>
+        </a:gradFill>
+        <a:gradFill rotWithShape="1">
+          <a:gsLst>
+            <a:gs pos="0">
+              <a:schemeClr val="phClr">
+                <a:tint val="80000"/>
+                <a:satMod val="300000"/>
+              </a:schemeClr>
+            </a:gs>
+            <a:gs pos="100000">
+              <a:schemeClr val="phClr">
+                <a:shade val="30000"/>
+                <a:satMod val="200000"/>
+              </a:schemeClr>
+            </a:gs>
+          </a:gsLst>
+          <a:path path="circle">
+            <a:fillToRect l="50000" t="50000" r="50000" b="50000"/>
+          </a:path>
+        </a:gradFill>
+      </a:bgFillStyleLst>
+    </a:fmtScheme>
+  </a:themeElements>
+</a:theme>
+</file>
+
+<file path=ppt/theme/theme2.xml><?xml version="1.0" encoding="utf-8"?>
 <a:theme xmlns:a="http://schemas.openxmlformats.org/drawingml/2006/main" xmlns:r="http://schemas.openxmlformats.org/officeDocument/2006/relationships" name="Office Theme">
   <a:themeElements>
     <a:clrScheme name="Office">
@@ -10501,283 +10823,4 @@
     </a:fmtScheme>
   </a:themeElements>
 </a:theme>
-</file>
-
-<file path=ppt/theme/theme2.xml><?xml version="1.0" encoding="utf-8"?>
-<a:theme xmlns:a="http://schemas.openxmlformats.org/drawingml/2006/main" xmlns:r="http://schemas.openxmlformats.org/officeDocument/2006/relationships" name="Office Theme">
-  <a:themeElements>
-    <a:clrScheme name="Office">
-      <a:dk1>
-        <a:srgbClr val="000000"/>
-      </a:dk1>
-      <a:lt1>
-        <a:srgbClr val="FFFFFF"/>
-      </a:lt1>
-      <a:dk2>
-        <a:srgbClr val="44546A"/>
-      </a:dk2>
-      <a:lt2>
-        <a:srgbClr val="E7E6E6"/>
-      </a:lt2>
-      <a:accent1>
-        <a:srgbClr val="5B9BD5"/>
-      </a:accent1>
-      <a:accent2>
-        <a:srgbClr val="ED7D31"/>
-      </a:accent2>
-      <a:accent3>
-        <a:srgbClr val="A5A5A5"/>
-      </a:accent3>
-      <a:accent4>
-        <a:srgbClr val="FFC000"/>
-      </a:accent4>
-      <a:accent5>
-        <a:srgbClr val="4472C4"/>
-      </a:accent5>
-      <a:accent6>
-        <a:srgbClr val="70AD47"/>
-      </a:accent6>
-      <a:hlink>
-        <a:srgbClr val="0563C1"/>
-      </a:hlink>
-      <a:folHlink>
-        <a:srgbClr val="954F72"/>
-      </a:folHlink>
-    </a:clrScheme>
-    <a:fontScheme name="Office">
-      <a:majorFont>
-        <a:latin typeface="Arial"/>
-        <a:ea typeface=""/>
-        <a:cs typeface=""/>
-        <a:font script="Jpan" typeface="ＭＳ Ｐゴシック"/>
-        <a:font script="Hang" typeface="맑은 고딕"/>
-        <a:font script="Hans" typeface="宋体"/>
-        <a:font script="Hant" typeface="新細明體"/>
-        <a:font script="Arab" typeface="Times New Roman"/>
-        <a:font script="Hebr" typeface="Times New Roman"/>
-        <a:font script="Thai" typeface="Angsana New"/>
-        <a:font script="Ethi" typeface="Nyala"/>
-        <a:font script="Beng" typeface="Vrinda"/>
-        <a:font script="Gujr" typeface="Shruti"/>
-        <a:font script="Khmr" typeface="MoolBoran"/>
-        <a:font script="Knda" typeface="Tunga"/>
-        <a:font script="Guru" typeface="Raavi"/>
-        <a:font script="Cans" typeface="Euphemia"/>
-        <a:font script="Cher" typeface="Plantagenet Cherokee"/>
-        <a:font script="Yiii" typeface="Microsoft Yi Baiti"/>
-        <a:font script="Tibt" typeface="Microsoft Himalaya"/>
-        <a:font script="Thaa" typeface="MV Boli"/>
-        <a:font script="Deva" typeface="Mangal"/>
-        <a:font script="Telu" typeface="Gautami"/>
-        <a:font script="Taml" typeface="Latha"/>
-        <a:font script="Syrc" typeface="Estrangelo Edessa"/>
-        <a:font script="Orya" typeface="Kalinga"/>
-        <a:font script="Mlym" typeface="Kartika"/>
-        <a:font script="Laoo" typeface="DokChampa"/>
-        <a:font script="Sinh" typeface="Iskoola Pota"/>
-        <a:font script="Mong" typeface="Mongolian Baiti"/>
-        <a:font script="Viet" typeface="Times New Roman"/>
-        <a:font script="Uigh" typeface="Microsoft Uighur"/>
-        <a:font script="Geor" typeface="Sylfaen"/>
-      </a:majorFont>
-      <a:minorFont>
-        <a:latin typeface="Arial"/>
-        <a:ea typeface=""/>
-        <a:cs typeface=""/>
-        <a:font script="Jpan" typeface="ＭＳ Ｐゴシック"/>
-        <a:font script="Hang" typeface="맑은 고딕"/>
-        <a:font script="Hans" typeface="宋体"/>
-        <a:font script="Hant" typeface="新細明體"/>
-        <a:font script="Arab" typeface="Arial"/>
-        <a:font script="Hebr" typeface="Arial"/>
-        <a:font script="Thai" typeface="Cordia New"/>
-        <a:font script="Ethi" typeface="Nyala"/>
-        <a:font script="Beng" typeface="Vrinda"/>
-        <a:font script="Gujr" typeface="Shruti"/>
-        <a:font script="Khmr" typeface="DaunPenh"/>
-        <a:font script="Knda" typeface="Tunga"/>
-        <a:font script="Guru" typeface="Raavi"/>
-        <a:font script="Cans" typeface="Euphemia"/>
-        <a:font script="Cher" typeface="Plantagenet Cherokee"/>
-        <a:font script="Yiii" typeface="Microsoft Yi Baiti"/>
-        <a:font script="Tibt" typeface="Microsoft Himalaya"/>
-        <a:font script="Thaa" typeface="MV Boli"/>
-        <a:font script="Deva" typeface="Mangal"/>
-        <a:font script="Telu" typeface="Gautami"/>
-        <a:font script="Taml" typeface="Latha"/>
-        <a:font script="Syrc" typeface="Estrangelo Edessa"/>
-        <a:font script="Orya" typeface="Kalinga"/>
-        <a:font script="Mlym" typeface="Kartika"/>
-        <a:font script="Laoo" typeface="DokChampa"/>
-        <a:font script="Sinh" typeface="Iskoola Pota"/>
-        <a:font script="Mong" typeface="Mongolian Baiti"/>
-        <a:font script="Viet" typeface="Arial"/>
-        <a:font script="Uigh" typeface="Microsoft Uighur"/>
-        <a:font script="Geor" typeface="Sylfaen"/>
-      </a:minorFont>
-    </a:fontScheme>
-    <a:fmtScheme name="Office">
-      <a:fillStyleLst>
-        <a:solidFill>
-          <a:schemeClr val="phClr"/>
-        </a:solidFill>
-        <a:gradFill rotWithShape="1">
-          <a:gsLst>
-            <a:gs pos="0">
-              <a:schemeClr val="phClr">
-                <a:tint val="50000"/>
-                <a:satMod val="300000"/>
-              </a:schemeClr>
-            </a:gs>
-            <a:gs pos="35000">
-              <a:schemeClr val="phClr">
-                <a:tint val="37000"/>
-                <a:satMod val="300000"/>
-              </a:schemeClr>
-            </a:gs>
-            <a:gs pos="100000">
-              <a:schemeClr val="phClr">
-                <a:tint val="15000"/>
-                <a:satMod val="350000"/>
-              </a:schemeClr>
-            </a:gs>
-          </a:gsLst>
-          <a:lin ang="16200000" scaled="1"/>
-        </a:gradFill>
-        <a:gradFill rotWithShape="1">
-          <a:gsLst>
-            <a:gs pos="0">
-              <a:schemeClr val="phClr">
-                <a:tint val="100000"/>
-                <a:shade val="100000"/>
-                <a:satMod val="130000"/>
-              </a:schemeClr>
-            </a:gs>
-            <a:gs pos="100000">
-              <a:schemeClr val="phClr">
-                <a:tint val="50000"/>
-                <a:shade val="100000"/>
-                <a:satMod val="350000"/>
-              </a:schemeClr>
-            </a:gs>
-          </a:gsLst>
-          <a:lin ang="16200000" scaled="0"/>
-        </a:gradFill>
-      </a:fillStyleLst>
-      <a:lnStyleLst>
-        <a:ln w="9525" cap="flat" cmpd="sng" algn="ctr">
-          <a:solidFill>
-            <a:schemeClr val="phClr">
-              <a:shade val="95000"/>
-              <a:satMod val="105000"/>
-            </a:schemeClr>
-          </a:solidFill>
-          <a:prstDash val="solid"/>
-        </a:ln>
-        <a:ln w="25400" cap="flat" cmpd="sng" algn="ctr">
-          <a:solidFill>
-            <a:schemeClr val="phClr"/>
-          </a:solidFill>
-          <a:prstDash val="solid"/>
-        </a:ln>
-        <a:ln w="38100" cap="flat" cmpd="sng" algn="ctr">
-          <a:solidFill>
-            <a:schemeClr val="phClr"/>
-          </a:solidFill>
-          <a:prstDash val="solid"/>
-        </a:ln>
-      </a:lnStyleLst>
-      <a:effectStyleLst>
-        <a:effectStyle>
-          <a:effectLst>
-            <a:outerShdw blurRad="40000" dist="20000" dir="5400000" rotWithShape="0">
-              <a:srgbClr val="000000">
-                <a:alpha val="38000"/>
-              </a:srgbClr>
-            </a:outerShdw>
-          </a:effectLst>
-        </a:effectStyle>
-        <a:effectStyle>
-          <a:effectLst>
-            <a:outerShdw blurRad="40000" dist="23000" dir="5400000" rotWithShape="0">
-              <a:srgbClr val="000000">
-                <a:alpha val="35000"/>
-              </a:srgbClr>
-            </a:outerShdw>
-          </a:effectLst>
-        </a:effectStyle>
-        <a:effectStyle>
-          <a:effectLst>
-            <a:outerShdw blurRad="40000" dist="23000" dir="5400000" rotWithShape="0">
-              <a:srgbClr val="000000">
-                <a:alpha val="35000"/>
-              </a:srgbClr>
-            </a:outerShdw>
-          </a:effectLst>
-          <a:scene3d>
-            <a:camera prst="orthographicFront">
-              <a:rot lat="0" lon="0" rev="0"/>
-            </a:camera>
-            <a:lightRig rig="threePt" dir="t">
-              <a:rot lat="0" lon="0" rev="1200000"/>
-            </a:lightRig>
-          </a:scene3d>
-          <a:sp3d>
-            <a:bevelT w="63500" h="25400"/>
-          </a:sp3d>
-        </a:effectStyle>
-      </a:effectStyleLst>
-      <a:bgFillStyleLst>
-        <a:solidFill>
-          <a:schemeClr val="phClr"/>
-        </a:solidFill>
-        <a:gradFill rotWithShape="1">
-          <a:gsLst>
-            <a:gs pos="0">
-              <a:schemeClr val="phClr">
-                <a:tint val="40000"/>
-                <a:satMod val="350000"/>
-              </a:schemeClr>
-            </a:gs>
-            <a:gs pos="40000">
-              <a:schemeClr val="phClr">
-                <a:tint val="45000"/>
-                <a:shade val="99000"/>
-                <a:satMod val="350000"/>
-              </a:schemeClr>
-            </a:gs>
-            <a:gs pos="100000">
-              <a:schemeClr val="phClr">
-                <a:shade val="20000"/>
-                <a:satMod val="255000"/>
-              </a:schemeClr>
-            </a:gs>
-          </a:gsLst>
-          <a:path path="circle">
-            <a:fillToRect l="50000" t="-80000" r="50000" b="180000"/>
-          </a:path>
-        </a:gradFill>
-        <a:gradFill rotWithShape="1">
-          <a:gsLst>
-            <a:gs pos="0">
-              <a:schemeClr val="phClr">
-                <a:tint val="80000"/>
-                <a:satMod val="300000"/>
-              </a:schemeClr>
-            </a:gs>
-            <a:gs pos="100000">
-              <a:schemeClr val="phClr">
-                <a:shade val="30000"/>
-                <a:satMod val="200000"/>
-              </a:schemeClr>
-            </a:gs>
-          </a:gsLst>
-          <a:path path="circle">
-            <a:fillToRect l="50000" t="50000" r="50000" b="50000"/>
-          </a:path>
-        </a:gradFill>
-      </a:bgFillStyleLst>
-    </a:fmtScheme>
-  </a:themeElements>
-</a:theme>
 </file>
</xml_diff>